<commit_message>
File headers and UML updates
</commit_message>
<xml_diff>
--- a/BattleshipGame/BattleshipGame/img/UML.pptx
+++ b/BattleshipGame/BattleshipGame/img/UML.pptx
@@ -260,7 +260,7 @@
           <a:p>
             <a:fld id="{FE379B95-C954-4CBB-9FE0-47926C448782}" type="datetimeFigureOut">
               <a:rPr lang="en-US" smtClean="0"/>
-              <a:t>01-Aug-24</a:t>
+              <a:t>11-Aug-24</a:t>
             </a:fld>
             <a:endParaRPr lang="en-US"/>
           </a:p>
@@ -458,7 +458,7 @@
           <a:p>
             <a:fld id="{FE379B95-C954-4CBB-9FE0-47926C448782}" type="datetimeFigureOut">
               <a:rPr lang="en-US" smtClean="0"/>
-              <a:t>01-Aug-24</a:t>
+              <a:t>11-Aug-24</a:t>
             </a:fld>
             <a:endParaRPr lang="en-US"/>
           </a:p>
@@ -666,7 +666,7 @@
           <a:p>
             <a:fld id="{FE379B95-C954-4CBB-9FE0-47926C448782}" type="datetimeFigureOut">
               <a:rPr lang="en-US" smtClean="0"/>
-              <a:t>01-Aug-24</a:t>
+              <a:t>11-Aug-24</a:t>
             </a:fld>
             <a:endParaRPr lang="en-US"/>
           </a:p>
@@ -864,7 +864,7 @@
           <a:p>
             <a:fld id="{FE379B95-C954-4CBB-9FE0-47926C448782}" type="datetimeFigureOut">
               <a:rPr lang="en-US" smtClean="0"/>
-              <a:t>01-Aug-24</a:t>
+              <a:t>11-Aug-24</a:t>
             </a:fld>
             <a:endParaRPr lang="en-US"/>
           </a:p>
@@ -1139,7 +1139,7 @@
           <a:p>
             <a:fld id="{FE379B95-C954-4CBB-9FE0-47926C448782}" type="datetimeFigureOut">
               <a:rPr lang="en-US" smtClean="0"/>
-              <a:t>01-Aug-24</a:t>
+              <a:t>11-Aug-24</a:t>
             </a:fld>
             <a:endParaRPr lang="en-US"/>
           </a:p>
@@ -1404,7 +1404,7 @@
           <a:p>
             <a:fld id="{FE379B95-C954-4CBB-9FE0-47926C448782}" type="datetimeFigureOut">
               <a:rPr lang="en-US" smtClean="0"/>
-              <a:t>01-Aug-24</a:t>
+              <a:t>11-Aug-24</a:t>
             </a:fld>
             <a:endParaRPr lang="en-US"/>
           </a:p>
@@ -1816,7 +1816,7 @@
           <a:p>
             <a:fld id="{FE379B95-C954-4CBB-9FE0-47926C448782}" type="datetimeFigureOut">
               <a:rPr lang="en-US" smtClean="0"/>
-              <a:t>01-Aug-24</a:t>
+              <a:t>11-Aug-24</a:t>
             </a:fld>
             <a:endParaRPr lang="en-US"/>
           </a:p>
@@ -1957,7 +1957,7 @@
           <a:p>
             <a:fld id="{FE379B95-C954-4CBB-9FE0-47926C448782}" type="datetimeFigureOut">
               <a:rPr lang="en-US" smtClean="0"/>
-              <a:t>01-Aug-24</a:t>
+              <a:t>11-Aug-24</a:t>
             </a:fld>
             <a:endParaRPr lang="en-US"/>
           </a:p>
@@ -2070,7 +2070,7 @@
           <a:p>
             <a:fld id="{FE379B95-C954-4CBB-9FE0-47926C448782}" type="datetimeFigureOut">
               <a:rPr lang="en-US" smtClean="0"/>
-              <a:t>01-Aug-24</a:t>
+              <a:t>11-Aug-24</a:t>
             </a:fld>
             <a:endParaRPr lang="en-US"/>
           </a:p>
@@ -2381,7 +2381,7 @@
           <a:p>
             <a:fld id="{FE379B95-C954-4CBB-9FE0-47926C448782}" type="datetimeFigureOut">
               <a:rPr lang="en-US" smtClean="0"/>
-              <a:t>01-Aug-24</a:t>
+              <a:t>11-Aug-24</a:t>
             </a:fld>
             <a:endParaRPr lang="en-US"/>
           </a:p>
@@ -2669,7 +2669,7 @@
           <a:p>
             <a:fld id="{FE379B95-C954-4CBB-9FE0-47926C448782}" type="datetimeFigureOut">
               <a:rPr lang="en-US" smtClean="0"/>
-              <a:t>01-Aug-24</a:t>
+              <a:t>11-Aug-24</a:t>
             </a:fld>
             <a:endParaRPr lang="en-US"/>
           </a:p>
@@ -2910,7 +2910,7 @@
           <a:p>
             <a:fld id="{FE379B95-C954-4CBB-9FE0-47926C448782}" type="datetimeFigureOut">
               <a:rPr lang="en-US" smtClean="0"/>
-              <a:t>01-Aug-24</a:t>
+              <a:t>11-Aug-24</a:t>
             </a:fld>
             <a:endParaRPr lang="en-US"/>
           </a:p>
@@ -3342,14 +3342,14 @@
           <p:nvPr>
             <p:extLst>
               <p:ext uri="{D42A27DB-BD31-4B8C-83A1-F6EECF244321}">
-                <p14:modId xmlns:p14="http://schemas.microsoft.com/office/powerpoint/2010/main" val="1562530342"/>
+                <p14:modId xmlns:p14="http://schemas.microsoft.com/office/powerpoint/2010/main" val="17939112"/>
               </p:ext>
             </p:extLst>
           </p:nvPr>
         </p:nvGraphicFramePr>
         <p:xfrm>
-          <a:off x="345644" y="246384"/>
-          <a:ext cx="2907598" cy="1112520"/>
+          <a:off x="555482" y="261623"/>
+          <a:ext cx="2697760" cy="1085833"/>
         </p:xfrm>
         <a:graphic>
           <a:graphicData uri="http://schemas.openxmlformats.org/drawingml/2006/table">
@@ -3358,7 +3358,7 @@
                 <a:tableStyleId>{5C22544A-7EE6-4342-B048-85BDC9FD1C3A}</a:tableStyleId>
               </a:tblPr>
               <a:tblGrid>
-                <a:gridCol w="2907598">
+                <a:gridCol w="2697760">
                   <a:extLst>
                     <a:ext uri="{9D8B030D-6E8A-4147-A177-3AD203B41FA5}">
                       <a16:colId xmlns:a16="http://schemas.microsoft.com/office/drawing/2014/main" val="1139854049"/>
@@ -3366,7 +3366,7 @@
                   </a:extLst>
                 </a:gridCol>
               </a:tblGrid>
-              <a:tr h="370840">
+              <a:tr h="354313">
                 <a:tc>
                   <a:txBody>
                     <a:bodyPr/>
@@ -3394,7 +3394,7 @@
                   </a:ext>
                 </a:extLst>
               </a:tr>
-              <a:tr h="370840">
+              <a:tr h="354313">
                 <a:tc>
                   <a:txBody>
                     <a:bodyPr/>
@@ -3411,22 +3411,22 @@
                   </a:ext>
                 </a:extLst>
               </a:tr>
-              <a:tr h="370840">
+              <a:tr h="354313">
                 <a:tc>
                   <a:txBody>
                     <a:bodyPr/>
                     <a:lstStyle/>
                     <a:p>
                       <a:r>
-                        <a:rPr lang="en-US" dirty="0"/>
+                        <a:rPr lang="en-US" sz="1600" dirty="0"/>
                         <a:t>+main(</a:t>
                       </a:r>
                       <a:r>
-                        <a:rPr lang="en-US" dirty="0" err="1"/>
+                        <a:rPr lang="en-US" sz="1600" dirty="0" err="1"/>
                         <a:t>args</a:t>
                       </a:r>
                       <a:r>
-                        <a:rPr lang="en-US" dirty="0"/>
+                        <a:rPr lang="en-US" sz="1600" dirty="0"/>
                         <a:t>: String[]): void</a:t>
                       </a:r>
                     </a:p>
@@ -3458,14 +3458,14 @@
           <p:nvPr>
             <p:extLst>
               <p:ext uri="{D42A27DB-BD31-4B8C-83A1-F6EECF244321}">
-                <p14:modId xmlns:p14="http://schemas.microsoft.com/office/powerpoint/2010/main" val="4073148022"/>
+                <p14:modId xmlns:p14="http://schemas.microsoft.com/office/powerpoint/2010/main" val="89517938"/>
               </p:ext>
             </p:extLst>
           </p:nvPr>
         </p:nvGraphicFramePr>
         <p:xfrm>
-          <a:off x="345644" y="2807700"/>
-          <a:ext cx="2907598" cy="3840480"/>
+          <a:off x="555482" y="2383628"/>
+          <a:ext cx="2907597" cy="4175760"/>
         </p:xfrm>
         <a:graphic>
           <a:graphicData uri="http://schemas.openxmlformats.org/drawingml/2006/table">
@@ -3474,7 +3474,7 @@
                 <a:tableStyleId>{5C22544A-7EE6-4342-B048-85BDC9FD1C3A}</a:tableStyleId>
               </a:tblPr>
               <a:tblGrid>
-                <a:gridCol w="2907598">
+                <a:gridCol w="2907597">
                   <a:extLst>
                     <a:ext uri="{9D8B030D-6E8A-4147-A177-3AD203B41FA5}">
                       <a16:colId xmlns:a16="http://schemas.microsoft.com/office/drawing/2014/main" val="3169994630"/>
@@ -3482,7 +3482,7 @@
                   </a:extLst>
                 </a:gridCol>
               </a:tblGrid>
-              <a:tr h="577499">
+              <a:tr h="545177">
                 <a:tc>
                   <a:txBody>
                     <a:bodyPr/>
@@ -3490,12 +3490,13 @@
                     <a:p>
                       <a:pPr algn="ctr"/>
                       <a:r>
-                        <a:rPr lang="en-US" b="1" dirty="0"/>
+                        <a:rPr lang="en-US" sz="1800" b="1" dirty="0"/>
                         <a:t>Ship</a:t>
                       </a:r>
+                      <a:endParaRPr lang="en-US" sz="1600" b="1" dirty="0"/>
                     </a:p>
                     <a:p>
-                      <a:endParaRPr lang="en-US" b="0" dirty="0"/>
+                      <a:endParaRPr lang="en-US" sz="1600" b="0" dirty="0"/>
                     </a:p>
                   </a:txBody>
                   <a:tcPr/>
@@ -3506,41 +3507,41 @@
                   </a:ext>
                 </a:extLst>
               </a:tr>
-              <a:tr h="1319998">
+              <a:tr h="1233822">
                 <a:tc>
                   <a:txBody>
                     <a:bodyPr/>
                     <a:lstStyle/>
                     <a:p>
                       <a:r>
-                        <a:rPr lang="en-US" dirty="0"/>
+                        <a:rPr lang="en-US" sz="1600" dirty="0"/>
                         <a:t>-size: int</a:t>
                       </a:r>
                       <a:br>
-                        <a:rPr lang="en-US" dirty="0"/>
+                        <a:rPr lang="en-US" sz="1600" dirty="0"/>
                       </a:br>
                       <a:r>
-                        <a:rPr lang="en-US" dirty="0"/>
+                        <a:rPr lang="en-US" sz="1600" dirty="0"/>
                         <a:t>-letter: char</a:t>
                       </a:r>
                       <a:br>
-                        <a:rPr lang="en-US" dirty="0"/>
+                        <a:rPr lang="en-US" sz="1600" dirty="0"/>
                       </a:br>
                       <a:r>
-                        <a:rPr lang="en-US" dirty="0"/>
+                        <a:rPr lang="en-US" sz="1600" dirty="0"/>
                         <a:t>-direction: char</a:t>
                       </a:r>
                       <a:br>
-                        <a:rPr lang="en-US" dirty="0"/>
+                        <a:rPr lang="en-US" sz="1600" dirty="0"/>
                       </a:br>
                       <a:r>
-                        <a:rPr lang="en-US" dirty="0"/>
+                        <a:rPr lang="en-US" sz="1600" dirty="0"/>
                         <a:t>-coord: Coordinate</a:t>
                       </a:r>
                       <a:br>
-                        <a:rPr lang="en-US" dirty="0"/>
+                        <a:rPr lang="en-US" sz="1600" dirty="0"/>
                       </a:br>
-                      <a:endParaRPr lang="en-US" dirty="0"/>
+                      <a:endParaRPr lang="en-US" sz="1600" dirty="0"/>
                     </a:p>
                   </a:txBody>
                   <a:tcPr/>
@@ -3551,80 +3552,136 @@
                   </a:ext>
                 </a:extLst>
               </a:tr>
-              <a:tr h="1567498">
+              <a:tr h="2123321">
                 <a:tc>
                   <a:txBody>
                     <a:bodyPr/>
                     <a:lstStyle/>
                     <a:p>
                       <a:r>
-                        <a:rPr lang="en-US" dirty="0"/>
+                        <a:rPr lang="en-US" sz="1400" dirty="0"/>
                         <a:t>+Ship(char, char, Coordinate)</a:t>
                       </a:r>
                       <a:br>
-                        <a:rPr lang="en-US" dirty="0"/>
+                        <a:rPr lang="en-US" sz="1400" dirty="0"/>
                       </a:br>
                       <a:r>
-                        <a:rPr lang="en-US" dirty="0"/>
+                        <a:rPr lang="en-US" sz="1400" dirty="0"/>
                         <a:t>+</a:t>
                       </a:r>
                       <a:r>
-                        <a:rPr lang="en-US" dirty="0" err="1"/>
+                        <a:rPr lang="en-US" sz="1400" dirty="0" err="1"/>
                         <a:t>getSize</a:t>
                       </a:r>
                       <a:r>
-                        <a:rPr lang="en-US" dirty="0"/>
+                        <a:rPr lang="en-US" sz="1400" dirty="0"/>
                         <a:t>(): int</a:t>
                       </a:r>
+                    </a:p>
+                    <a:p>
+                      <a:r>
+                        <a:rPr lang="en-US" sz="1400" dirty="0"/>
+                        <a:t>-</a:t>
+                      </a:r>
+                      <a:r>
+                        <a:rPr lang="en-US" sz="1400" dirty="0" err="1"/>
+                        <a:t>setSize</a:t>
+                      </a:r>
+                      <a:r>
+                        <a:rPr lang="en-US" sz="1400" dirty="0"/>
+                        <a:t>(char): void</a:t>
+                      </a:r>
                       <a:br>
-                        <a:rPr lang="en-US" dirty="0"/>
+                        <a:rPr lang="en-US" sz="1400" dirty="0"/>
                       </a:br>
                       <a:r>
-                        <a:rPr lang="en-US" dirty="0"/>
+                        <a:rPr lang="en-US" sz="1400" dirty="0"/>
                         <a:t>+</a:t>
                       </a:r>
                       <a:r>
-                        <a:rPr lang="en-US" dirty="0" err="1"/>
+                        <a:rPr lang="en-US" sz="1400" dirty="0" err="1"/>
                         <a:t>getLetter</a:t>
                       </a:r>
                       <a:r>
-                        <a:rPr lang="en-US" dirty="0"/>
+                        <a:rPr lang="en-US" sz="1400" dirty="0"/>
                         <a:t>(): char</a:t>
                       </a:r>
+                    </a:p>
+                    <a:p>
+                      <a:r>
+                        <a:rPr lang="en-US" sz="1400" dirty="0"/>
+                        <a:t>-</a:t>
+                      </a:r>
+                      <a:r>
+                        <a:rPr lang="en-US" sz="1400" dirty="0" err="1"/>
+                        <a:t>setLetter</a:t>
+                      </a:r>
+                      <a:r>
+                        <a:rPr lang="en-US" sz="1400" dirty="0"/>
+                        <a:t>(char): void</a:t>
+                      </a:r>
                       <a:br>
-                        <a:rPr lang="en-US" dirty="0"/>
+                        <a:rPr lang="en-US" sz="1400" dirty="0"/>
                       </a:br>
                       <a:r>
-                        <a:rPr lang="en-US" dirty="0"/>
+                        <a:rPr lang="en-US" sz="1400" dirty="0"/>
                         <a:t>+</a:t>
                       </a:r>
                       <a:r>
-                        <a:rPr lang="en-US" dirty="0" err="1"/>
+                        <a:rPr lang="en-US" sz="1400" dirty="0" err="1"/>
                         <a:t>getDirection</a:t>
                       </a:r>
                       <a:r>
-                        <a:rPr lang="en-US" dirty="0"/>
+                        <a:rPr lang="en-US" sz="1400" dirty="0"/>
                         <a:t>(): char</a:t>
                       </a:r>
+                    </a:p>
+                    <a:p>
+                      <a:r>
+                        <a:rPr lang="en-US" sz="1400" dirty="0"/>
+                        <a:t>-</a:t>
+                      </a:r>
+                      <a:r>
+                        <a:rPr lang="en-US" sz="1400" dirty="0" err="1"/>
+                        <a:t>setDirection</a:t>
+                      </a:r>
+                      <a:r>
+                        <a:rPr lang="en-US" sz="1400" dirty="0"/>
+                        <a:t>(char): void</a:t>
+                      </a:r>
                       <a:br>
-                        <a:rPr lang="en-US" dirty="0"/>
+                        <a:rPr lang="en-US" sz="1400" dirty="0"/>
                       </a:br>
                       <a:r>
-                        <a:rPr lang="en-US" dirty="0"/>
+                        <a:rPr lang="en-US" sz="1400" dirty="0"/>
                         <a:t>+</a:t>
                       </a:r>
                       <a:r>
-                        <a:rPr lang="en-US" dirty="0" err="1"/>
+                        <a:rPr lang="en-US" sz="1400" dirty="0" err="1"/>
                         <a:t>getCoordinate</a:t>
                       </a:r>
                       <a:r>
-                        <a:rPr lang="en-US" dirty="0"/>
+                        <a:rPr lang="en-US" sz="1400" dirty="0"/>
                         <a:t>(): Coordinate</a:t>
                       </a:r>
+                    </a:p>
+                    <a:p>
+                      <a:r>
+                        <a:rPr lang="en-US" sz="1400" dirty="0"/>
+                        <a:t>-</a:t>
+                      </a:r>
+                      <a:r>
+                        <a:rPr lang="en-US" sz="1400" dirty="0" err="1"/>
+                        <a:t>setCoordinate</a:t>
+                      </a:r>
+                      <a:r>
+                        <a:rPr lang="en-US" sz="1400" dirty="0"/>
+                        <a:t>(Coordinate): void</a:t>
+                      </a:r>
                       <a:br>
-                        <a:rPr lang="en-US" dirty="0"/>
+                        <a:rPr lang="en-US" sz="1600" dirty="0"/>
                       </a:br>
-                      <a:endParaRPr lang="en-US" dirty="0"/>
+                      <a:endParaRPr lang="en-US" sz="1600" dirty="0"/>
                     </a:p>
                   </a:txBody>
                   <a:tcPr/>
@@ -3654,14 +3711,14 @@
           <p:nvPr>
             <p:extLst>
               <p:ext uri="{D42A27DB-BD31-4B8C-83A1-F6EECF244321}">
-                <p14:modId xmlns:p14="http://schemas.microsoft.com/office/powerpoint/2010/main" val="3525865598"/>
+                <p14:modId xmlns:p14="http://schemas.microsoft.com/office/powerpoint/2010/main" val="379376565"/>
               </p:ext>
             </p:extLst>
           </p:nvPr>
         </p:nvGraphicFramePr>
         <p:xfrm>
-          <a:off x="4573264" y="2807701"/>
-          <a:ext cx="2697761" cy="2528518"/>
+          <a:off x="6228523" y="2383628"/>
+          <a:ext cx="2697761" cy="2315158"/>
         </p:xfrm>
         <a:graphic>
           <a:graphicData uri="http://schemas.openxmlformats.org/drawingml/2006/table">
@@ -3686,9 +3743,10 @@
                     <a:p>
                       <a:pPr algn="ctr"/>
                       <a:r>
-                        <a:rPr lang="en-US" b="1" dirty="0"/>
+                        <a:rPr lang="en-US" sz="1800" b="1" dirty="0"/>
                         <a:t>Coordinate</a:t>
                       </a:r>
+                      <a:endParaRPr lang="en-US" sz="1600" b="1" dirty="0"/>
                     </a:p>
                   </a:txBody>
                   <a:tcPr/>
@@ -3706,30 +3764,29 @@
                     <a:lstStyle/>
                     <a:p>
                       <a:r>
-                        <a:rPr lang="en-US" dirty="0"/>
+                        <a:rPr lang="en-US" sz="1600" dirty="0"/>
                         <a:t>-</a:t>
                       </a:r>
                       <a:r>
-                        <a:rPr lang="en-US" dirty="0" err="1"/>
+                        <a:rPr lang="en-US" sz="1600" dirty="0" err="1"/>
+                        <a:t>yCor</a:t>
+                      </a:r>
+                      <a:r>
+                        <a:rPr lang="en-US" sz="1600" dirty="0"/>
+                        <a:t>: char</a:t>
+                      </a:r>
+                    </a:p>
+                    <a:p>
+                      <a:r>
+                        <a:rPr lang="en-US" sz="1600" dirty="0"/>
+                        <a:t>-</a:t>
+                      </a:r>
+                      <a:r>
+                        <a:rPr lang="en-US" sz="1600" dirty="0" err="1"/>
                         <a:t>xCor</a:t>
                       </a:r>
                       <a:r>
-                        <a:rPr lang="en-US" dirty="0"/>
-                        <a:t>: int</a:t>
-                      </a:r>
-                      <a:br>
-                        <a:rPr lang="en-US" dirty="0"/>
-                      </a:br>
-                      <a:r>
-                        <a:rPr lang="en-US" dirty="0"/>
-                        <a:t>-</a:t>
-                      </a:r>
-                      <a:r>
-                        <a:rPr lang="en-US" dirty="0" err="1"/>
-                        <a:t>yCor</a:t>
-                      </a:r>
-                      <a:r>
-                        <a:rPr lang="en-US" dirty="0"/>
+                        <a:rPr lang="en-US" sz="1600" dirty="0"/>
                         <a:t>: int</a:t>
                       </a:r>
                     </a:p>
@@ -3749,57 +3806,56 @@
                     <a:lstStyle/>
                     <a:p>
                       <a:r>
-                        <a:rPr lang="en-US" dirty="0"/>
+                        <a:rPr lang="en-US" sz="1600" dirty="0"/>
                         <a:t>+Coordinate()</a:t>
                       </a:r>
                     </a:p>
                     <a:p>
                       <a:r>
-                        <a:rPr lang="en-US" dirty="0"/>
-                        <a:t>+Coordinate(int, int)</a:t>
+                        <a:rPr lang="en-US" sz="1600" dirty="0"/>
+                        <a:t>+Coordinate(char, int)</a:t>
                       </a:r>
                     </a:p>
                     <a:p>
                       <a:r>
-                        <a:rPr lang="en-US" dirty="0"/>
+                        <a:rPr lang="en-US" sz="1600" dirty="0"/>
                         <a:t>+</a:t>
                       </a:r>
                       <a:r>
-                        <a:rPr lang="en-US" dirty="0" err="1"/>
+                        <a:rPr lang="en-US" sz="1600" dirty="0" err="1"/>
+                        <a:t>getY</a:t>
+                      </a:r>
+                      <a:r>
+                        <a:rPr lang="en-US" sz="1600" dirty="0"/>
+                        <a:t>(): char</a:t>
+                      </a:r>
+                    </a:p>
+                    <a:p>
+                      <a:r>
+                        <a:rPr lang="en-US" sz="1600" dirty="0"/>
+                        <a:t>+</a:t>
+                      </a:r>
+                      <a:r>
+                        <a:rPr lang="en-US" sz="1600" dirty="0" err="1"/>
                         <a:t>getX</a:t>
                       </a:r>
                       <a:r>
-                        <a:rPr lang="en-US" dirty="0"/>
+                        <a:rPr lang="en-US" sz="1600" dirty="0"/>
                         <a:t>(): int</a:t>
                       </a:r>
                       <a:br>
-                        <a:rPr lang="en-US" dirty="0"/>
+                        <a:rPr lang="en-US" sz="1600" dirty="0"/>
                       </a:br>
                       <a:r>
-                        <a:rPr lang="en-US" dirty="0"/>
+                        <a:rPr lang="en-US" sz="1600" dirty="0"/>
                         <a:t>+</a:t>
                       </a:r>
                       <a:r>
-                        <a:rPr lang="en-US" dirty="0" err="1"/>
-                        <a:t>getY</a:t>
-                      </a:r>
-                      <a:r>
-                        <a:rPr lang="en-US" dirty="0"/>
-                        <a:t>(): int</a:t>
-                      </a:r>
-                      <a:br>
-                        <a:rPr lang="en-US" dirty="0"/>
-                      </a:br>
-                      <a:r>
-                        <a:rPr lang="en-US" dirty="0"/>
-                        <a:t>+</a:t>
-                      </a:r>
-                      <a:r>
-                        <a:rPr lang="en-US" dirty="0" err="1"/>
+                        <a:rPr lang="en-US" sz="1600" dirty="0" err="1"/>
                         <a:t>toString</a:t>
                       </a:r>
                       <a:r>
-                        <a:rPr lang="en-US" dirty="0"/>
+                        <a:rPr lang="en-US" sz="1600" dirty="0"/>
                         <a:t>(): String</a:t>
                       </a:r>
                     </a:p>
@@ -3825,13 +3881,15 @@
               </a:ext>
             </a:extLst>
           </p:cNvPr>
-          <p:cNvCxnSpPr/>
+          <p:cNvCxnSpPr>
+            <a:cxnSpLocks/>
+          </p:cNvCxnSpPr>
           <p:nvPr/>
         </p:nvCxnSpPr>
         <p:spPr>
           <a:xfrm flipH="1">
-            <a:off x="3253242" y="3003826"/>
-            <a:ext cx="1274584" cy="0"/>
+            <a:off x="3405810" y="2579757"/>
+            <a:ext cx="2822713" cy="0"/>
           </a:xfrm>
           <a:prstGeom prst="straightConnector1">
             <a:avLst/>
@@ -3869,7 +3927,7 @@
         </p:nvSpPr>
         <p:spPr>
           <a:xfrm rot="5400000">
-            <a:off x="3512657" y="2839555"/>
+            <a:off x="3676928" y="2415464"/>
             <a:ext cx="229697" cy="328541"/>
           </a:xfrm>
           <a:prstGeom prst="triangle">
@@ -3918,8 +3976,8 @@
         </p:nvSpPr>
         <p:spPr>
           <a:xfrm>
-            <a:off x="3358870" y="2411895"/>
-            <a:ext cx="1108765" cy="1600438"/>
+            <a:off x="3791777" y="2244034"/>
+            <a:ext cx="2474691" cy="954107"/>
           </a:xfrm>
           <a:prstGeom prst="rect">
             <a:avLst/>
@@ -3932,6 +3990,7 @@
           </a:bodyPr>
           <a:lstStyle/>
           <a:p>
+            <a:pPr algn="ctr"/>
             <a:r>
               <a:rPr lang="en-US" sz="1400" dirty="0"/>
               <a:t>Composition Relationship</a:t>
@@ -3947,6 +4006,76 @@
               <a:t>The Ship is “composed” of a Coordinate</a:t>
             </a:r>
             <a:endParaRPr lang="en-US" dirty="0"/>
+          </a:p>
+        </p:txBody>
+      </p:sp>
+      <p:sp>
+        <p:nvSpPr>
+          <p:cNvPr id="7" name="TextBox 6">
+            <a:extLst>
+              <a:ext uri="{FF2B5EF4-FFF2-40B4-BE49-F238E27FC236}">
+                <a16:creationId xmlns:a16="http://schemas.microsoft.com/office/drawing/2014/main" id="{371B2D8B-3C82-1874-881E-FAC38952F804}"/>
+              </a:ext>
+            </a:extLst>
+          </p:cNvPr>
+          <p:cNvSpPr txBox="1"/>
+          <p:nvPr/>
+        </p:nvSpPr>
+        <p:spPr>
+          <a:xfrm>
+            <a:off x="5907185" y="1927693"/>
+            <a:ext cx="642676" cy="369332"/>
+          </a:xfrm>
+          <a:prstGeom prst="rect">
+            <a:avLst/>
+          </a:prstGeom>
+          <a:noFill/>
+        </p:spPr>
+        <p:txBody>
+          <a:bodyPr wrap="none" rtlCol="0">
+            <a:spAutoFit/>
+          </a:bodyPr>
+          <a:lstStyle/>
+          <a:p>
+            <a:r>
+              <a:rPr lang="en-US" dirty="0"/>
+              <a:t>‘1..*’</a:t>
+            </a:r>
+          </a:p>
+        </p:txBody>
+      </p:sp>
+      <p:sp>
+        <p:nvSpPr>
+          <p:cNvPr id="11" name="TextBox 10">
+            <a:extLst>
+              <a:ext uri="{FF2B5EF4-FFF2-40B4-BE49-F238E27FC236}">
+                <a16:creationId xmlns:a16="http://schemas.microsoft.com/office/drawing/2014/main" id="{8EC2212B-025C-FFD5-B102-A9C261138B8A}"/>
+              </a:ext>
+            </a:extLst>
+          </p:cNvPr>
+          <p:cNvSpPr txBox="1"/>
+          <p:nvPr/>
+        </p:nvSpPr>
+        <p:spPr>
+          <a:xfrm>
+            <a:off x="3184797" y="1927693"/>
+            <a:ext cx="556563" cy="369332"/>
+          </a:xfrm>
+          <a:prstGeom prst="rect">
+            <a:avLst/>
+          </a:prstGeom>
+          <a:noFill/>
+        </p:spPr>
+        <p:txBody>
+          <a:bodyPr wrap="none" rtlCol="0">
+            <a:spAutoFit/>
+          </a:bodyPr>
+          <a:lstStyle/>
+          <a:p>
+            <a:r>
+              <a:rPr lang="en-US" dirty="0"/>
+              <a:t>‘10’</a:t>
+            </a:r>
           </a:p>
         </p:txBody>
       </p:sp>
@@ -3995,14 +4124,14 @@
           <p:nvPr>
             <p:extLst>
               <p:ext uri="{D42A27DB-BD31-4B8C-83A1-F6EECF244321}">
-                <p14:modId xmlns:p14="http://schemas.microsoft.com/office/powerpoint/2010/main" val="2776047974"/>
+                <p14:modId xmlns:p14="http://schemas.microsoft.com/office/powerpoint/2010/main" val="847416894"/>
               </p:ext>
             </p:extLst>
           </p:nvPr>
         </p:nvGraphicFramePr>
         <p:xfrm>
           <a:off x="191035" y="73660"/>
-          <a:ext cx="3872966" cy="6630618"/>
+          <a:ext cx="3872966" cy="6710680"/>
         </p:xfrm>
         <a:graphic>
           <a:graphicData uri="http://schemas.openxmlformats.org/drawingml/2006/table">
@@ -4019,7 +4148,7 @@
                   </a:extLst>
                 </a:gridCol>
               </a:tblGrid>
-              <a:tr h="405050">
+              <a:tr h="383679">
                 <a:tc>
                   <a:txBody>
                     <a:bodyPr/>
@@ -4027,9 +4156,10 @@
                     <a:p>
                       <a:pPr algn="ctr"/>
                       <a:r>
-                        <a:rPr lang="en-US" sz="1600" b="1" dirty="0"/>
+                        <a:rPr lang="en-US" sz="1800" b="1" dirty="0"/>
                         <a:t>Boards</a:t>
                       </a:r>
+                      <a:endParaRPr lang="en-US" sz="1600" b="1" dirty="0"/>
                     </a:p>
                   </a:txBody>
                   <a:tcPr>
@@ -4047,193 +4177,190 @@
                   </a:ext>
                 </a:extLst>
               </a:tr>
-              <a:tr h="3096138">
+              <a:tr h="2264104">
                 <a:tc>
                   <a:txBody>
                     <a:bodyPr/>
                     <a:lstStyle/>
                     <a:p>
                       <a:r>
-                        <a:rPr lang="en-US" sz="1400" dirty="0"/>
+                        <a:rPr lang="en-US" sz="1100" dirty="0"/>
                         <a:t>-</a:t>
                       </a:r>
                       <a:r>
-                        <a:rPr lang="en-US" sz="1400" dirty="0" err="1"/>
+                        <a:rPr lang="en-US" sz="1100" dirty="0" err="1"/>
                         <a:t>boardA</a:t>
                       </a:r>
                       <a:r>
-                        <a:rPr lang="en-US" sz="1400" dirty="0"/>
+                        <a:rPr lang="en-US" sz="1100" dirty="0"/>
                         <a:t>: char[][]</a:t>
                       </a:r>
                       <a:br>
-                        <a:rPr lang="en-US" sz="1400" dirty="0"/>
+                        <a:rPr lang="en-US" sz="1100" dirty="0"/>
                       </a:br>
                       <a:r>
-                        <a:rPr lang="en-US" sz="1400" dirty="0"/>
+                        <a:rPr lang="en-US" sz="1100" dirty="0"/>
                         <a:t>-</a:t>
                       </a:r>
                       <a:r>
-                        <a:rPr lang="en-US" sz="1400" dirty="0" err="1"/>
+                        <a:rPr lang="en-US" sz="1100" dirty="0" err="1"/>
                         <a:t>boardB</a:t>
                       </a:r>
                       <a:r>
-                        <a:rPr lang="en-US" sz="1400" dirty="0"/>
+                        <a:rPr lang="en-US" sz="1100" dirty="0"/>
                         <a:t>: char[][]</a:t>
                       </a:r>
                       <a:br>
-                        <a:rPr lang="en-US" sz="1400" dirty="0"/>
+                        <a:rPr lang="en-US" sz="1100" dirty="0"/>
                       </a:br>
                       <a:r>
-                        <a:rPr lang="en-US" sz="1400" dirty="0"/>
+                        <a:rPr lang="en-US" sz="1100" dirty="0"/>
                         <a:t>-</a:t>
                       </a:r>
                       <a:r>
-                        <a:rPr lang="en-US" sz="1400" dirty="0" err="1"/>
+                        <a:rPr lang="en-US" sz="1100" dirty="0" err="1"/>
                         <a:t>numAircraftPlay</a:t>
                       </a:r>
                       <a:r>
-                        <a:rPr lang="en-US" sz="1400" dirty="0"/>
+                        <a:rPr lang="en-US" sz="1100" dirty="0"/>
                         <a:t>: int</a:t>
                       </a:r>
                       <a:br>
-                        <a:rPr lang="en-US" sz="1400" dirty="0"/>
+                        <a:rPr lang="en-US" sz="1100" dirty="0"/>
                       </a:br>
                       <a:r>
-                        <a:rPr lang="en-US" sz="1400" dirty="0"/>
+                        <a:rPr lang="en-US" sz="1100" dirty="0"/>
                         <a:t>-</a:t>
                       </a:r>
                       <a:r>
-                        <a:rPr lang="en-US" sz="1400" dirty="0" err="1"/>
+                        <a:rPr lang="en-US" sz="1100" dirty="0" err="1"/>
                         <a:t>numBattleshipPlay</a:t>
                       </a:r>
                       <a:r>
-                        <a:rPr lang="en-US" sz="1400" dirty="0"/>
+                        <a:rPr lang="en-US" sz="1100" dirty="0"/>
                         <a:t>: int</a:t>
                       </a:r>
                       <a:br>
-                        <a:rPr lang="en-US" sz="1400" dirty="0"/>
+                        <a:rPr lang="en-US" sz="1100" dirty="0"/>
                       </a:br>
                       <a:r>
-                        <a:rPr lang="en-US" sz="1400" dirty="0"/>
+                        <a:rPr lang="en-US" sz="1100" dirty="0"/>
                         <a:t>-</a:t>
                       </a:r>
                       <a:r>
-                        <a:rPr lang="en-US" sz="1400" dirty="0" err="1"/>
+                        <a:rPr lang="en-US" sz="1100" dirty="0" err="1"/>
                         <a:t>numDestroyerPlay</a:t>
                       </a:r>
                       <a:r>
-                        <a:rPr lang="en-US" sz="1400" dirty="0"/>
+                        <a:rPr lang="en-US" sz="1100" dirty="0"/>
                         <a:t>: int</a:t>
                       </a:r>
                       <a:br>
-                        <a:rPr lang="en-US" sz="1400" dirty="0"/>
+                        <a:rPr lang="en-US" sz="1100" dirty="0"/>
                       </a:br>
                       <a:r>
-                        <a:rPr lang="en-US" sz="1400" dirty="0"/>
+                        <a:rPr lang="en-US" sz="1100" dirty="0"/>
                         <a:t>-</a:t>
                       </a:r>
                       <a:r>
-                        <a:rPr lang="en-US" sz="1400" dirty="0" err="1"/>
+                        <a:rPr lang="en-US" sz="1100" dirty="0" err="1"/>
                         <a:t>numSubmarinePlay</a:t>
                       </a:r>
                       <a:r>
-                        <a:rPr lang="en-US" sz="1400" dirty="0"/>
+                        <a:rPr lang="en-US" sz="1100" dirty="0"/>
                         <a:t>: int</a:t>
                       </a:r>
                       <a:br>
-                        <a:rPr lang="en-US" sz="1400" dirty="0"/>
+                        <a:rPr lang="en-US" sz="1100" dirty="0"/>
                       </a:br>
                       <a:r>
-                        <a:rPr lang="en-US" sz="1400" dirty="0"/>
+                        <a:rPr lang="en-US" sz="1100" dirty="0"/>
                         <a:t>-</a:t>
                       </a:r>
                       <a:r>
-                        <a:rPr lang="en-US" sz="1400" dirty="0" err="1"/>
+                        <a:rPr lang="en-US" sz="1100" dirty="0" err="1"/>
                         <a:t>numPatrolBoatPlay</a:t>
                       </a:r>
                       <a:r>
-                        <a:rPr lang="en-US" sz="1400" dirty="0"/>
+                        <a:rPr lang="en-US" sz="1100" dirty="0"/>
                         <a:t>: int</a:t>
                       </a:r>
                       <a:br>
-                        <a:rPr lang="en-US" sz="1400" dirty="0"/>
+                        <a:rPr lang="en-US" sz="1100" dirty="0"/>
                       </a:br>
                       <a:r>
-                        <a:rPr lang="en-US" sz="1400" dirty="0"/>
+                        <a:rPr lang="en-US" sz="1100" dirty="0"/>
                         <a:t>-</a:t>
                       </a:r>
                       <a:r>
-                        <a:rPr lang="en-US" sz="1400" dirty="0" err="1"/>
+                        <a:rPr lang="en-US" sz="1100" dirty="0" err="1"/>
                         <a:t>numAircraftComp</a:t>
                       </a:r>
                       <a:r>
-                        <a:rPr lang="en-US" sz="1400" dirty="0"/>
+                        <a:rPr lang="en-US" sz="1100" dirty="0"/>
                         <a:t>: int</a:t>
                       </a:r>
                       <a:br>
-                        <a:rPr lang="en-US" sz="1400" dirty="0"/>
+                        <a:rPr lang="en-US" sz="1100" dirty="0"/>
                       </a:br>
                       <a:r>
-                        <a:rPr lang="en-US" sz="1400" dirty="0"/>
+                        <a:rPr lang="en-US" sz="1100" dirty="0"/>
                         <a:t>-</a:t>
                       </a:r>
                       <a:r>
-                        <a:rPr lang="en-US" sz="1400" dirty="0" err="1"/>
+                        <a:rPr lang="en-US" sz="1100" dirty="0" err="1"/>
                         <a:t>numBattleshipComp</a:t>
                       </a:r>
                       <a:r>
-                        <a:rPr lang="en-US" sz="1400" dirty="0"/>
+                        <a:rPr lang="en-US" sz="1100" dirty="0"/>
                         <a:t>: int</a:t>
                       </a:r>
                       <a:br>
-                        <a:rPr lang="en-US" sz="1400" dirty="0"/>
+                        <a:rPr lang="en-US" sz="1100" dirty="0"/>
                       </a:br>
                       <a:r>
-                        <a:rPr lang="en-US" sz="1400" dirty="0"/>
+                        <a:rPr lang="en-US" sz="1100" dirty="0"/>
                         <a:t>-</a:t>
                       </a:r>
                       <a:r>
-                        <a:rPr lang="en-US" sz="1400" dirty="0" err="1"/>
+                        <a:rPr lang="en-US" sz="1100" dirty="0" err="1"/>
                         <a:t>numDestroyerComp</a:t>
                       </a:r>
                       <a:r>
-                        <a:rPr lang="en-US" sz="1400" dirty="0"/>
+                        <a:rPr lang="en-US" sz="1100" dirty="0"/>
                         <a:t>: int</a:t>
                       </a:r>
                       <a:br>
-                        <a:rPr lang="en-US" sz="1400" dirty="0"/>
+                        <a:rPr lang="en-US" sz="1100" dirty="0"/>
                       </a:br>
                       <a:r>
-                        <a:rPr lang="en-US" sz="1400" dirty="0"/>
+                        <a:rPr lang="en-US" sz="1100" dirty="0"/>
                         <a:t>-</a:t>
                       </a:r>
                       <a:r>
-                        <a:rPr lang="en-US" sz="1400" dirty="0" err="1"/>
+                        <a:rPr lang="en-US" sz="1100" dirty="0" err="1"/>
                         <a:t>numSubmarineComp</a:t>
                       </a:r>
                       <a:r>
-                        <a:rPr lang="en-US" sz="1400" dirty="0"/>
+                        <a:rPr lang="en-US" sz="1100" dirty="0"/>
                         <a:t>: int</a:t>
                       </a:r>
                       <a:br>
-                        <a:rPr lang="en-US" sz="1400" dirty="0"/>
+                        <a:rPr lang="en-US" sz="1100" dirty="0"/>
                       </a:br>
                       <a:r>
-                        <a:rPr lang="en-US" sz="1400" dirty="0"/>
+                        <a:rPr lang="en-US" sz="1100" dirty="0"/>
                         <a:t>-</a:t>
                       </a:r>
                       <a:r>
-                        <a:rPr lang="en-US" sz="1400" dirty="0" err="1"/>
+                        <a:rPr lang="en-US" sz="1100" dirty="0" err="1"/>
                         <a:t>numPatrolBoatComp</a:t>
                       </a:r>
                       <a:r>
-                        <a:rPr lang="en-US" sz="1400" dirty="0"/>
+                        <a:rPr lang="en-US" sz="1100" dirty="0"/>
                         <a:t>: int</a:t>
                       </a:r>
-                      <a:br>
-                        <a:rPr lang="en-US" sz="1200" dirty="0"/>
-                      </a:br>
-                      <a:endParaRPr lang="en-US" sz="1200" dirty="0"/>
+                      <a:endParaRPr lang="en-US" sz="1050" dirty="0"/>
                     </a:p>
                   </a:txBody>
                   <a:tcPr/>
@@ -4244,205 +4371,346 @@
                   </a:ext>
                 </a:extLst>
               </a:tr>
-              <a:tr h="3129430">
+              <a:tr h="4062897">
                 <a:tc>
                   <a:txBody>
                     <a:bodyPr/>
                     <a:lstStyle/>
                     <a:p>
                       <a:r>
-                        <a:rPr lang="en-US" sz="1400" dirty="0"/>
+                        <a:rPr lang="en-US" sz="1100" dirty="0"/>
                         <a:t>+Boards()</a:t>
                       </a:r>
                     </a:p>
                     <a:p>
                       <a:r>
-                        <a:rPr lang="en-US" sz="1400" dirty="0"/>
+                        <a:rPr lang="en-US" sz="1100" dirty="0"/>
                         <a:t>+</a:t>
                       </a:r>
                       <a:r>
-                        <a:rPr lang="en-US" sz="1400" dirty="0" err="1"/>
+                        <a:rPr lang="en-US" sz="1100" dirty="0" err="1"/>
+                        <a:t>getNumAircraftPlay</a:t>
+                      </a:r>
+                      <a:r>
+                        <a:rPr lang="en-US" sz="1100" dirty="0"/>
+                        <a:t>(): int</a:t>
+                      </a:r>
+                    </a:p>
+                    <a:p>
+                      <a:r>
+                        <a:rPr lang="en-US" sz="1100" dirty="0"/>
+                        <a:t>+</a:t>
+                      </a:r>
+                      <a:r>
+                        <a:rPr lang="en-US" sz="1100" dirty="0" err="1"/>
+                        <a:t>getNumBattleshipPlay</a:t>
+                      </a:r>
+                      <a:r>
+                        <a:rPr lang="en-US" sz="1100" dirty="0"/>
+                        <a:t>(): int</a:t>
+                      </a:r>
+                    </a:p>
+                    <a:p>
+                      <a:r>
+                        <a:rPr lang="en-US" sz="1100" dirty="0"/>
+                        <a:t>+</a:t>
+                      </a:r>
+                      <a:r>
+                        <a:rPr lang="en-US" sz="1100" dirty="0" err="1"/>
+                        <a:t>getNumDestroyerPlay</a:t>
+                      </a:r>
+                      <a:r>
+                        <a:rPr lang="en-US" sz="1100" dirty="0"/>
+                        <a:t>(): int</a:t>
+                      </a:r>
+                    </a:p>
+                    <a:p>
+                      <a:r>
+                        <a:rPr lang="en-US" sz="1100" dirty="0"/>
+                        <a:t>+</a:t>
+                      </a:r>
+                      <a:r>
+                        <a:rPr lang="en-US" sz="1100" dirty="0" err="1"/>
+                        <a:t>getNumSubmarinePlay</a:t>
+                      </a:r>
+                      <a:r>
+                        <a:rPr lang="en-US" sz="1100" dirty="0"/>
+                        <a:t>(): int</a:t>
+                      </a:r>
+                    </a:p>
+                    <a:p>
+                      <a:r>
+                        <a:rPr lang="en-US" sz="1100" dirty="0"/>
+                        <a:t>+</a:t>
+                      </a:r>
+                      <a:r>
+                        <a:rPr lang="en-US" sz="1100" dirty="0" err="1"/>
+                        <a:t>getNumPatrolBoatPlay</a:t>
+                      </a:r>
+                      <a:r>
+                        <a:rPr lang="en-US" sz="1100" dirty="0"/>
+                        <a:t>(): int</a:t>
+                      </a:r>
+                      <a:br>
+                        <a:rPr lang="en-US" sz="1100" dirty="0"/>
+                      </a:br>
+                      <a:r>
+                        <a:rPr lang="en-US" sz="1100" dirty="0"/>
+                        <a:t>+</a:t>
+                      </a:r>
+                      <a:r>
+                        <a:rPr lang="en-US" sz="1100" dirty="0" err="1"/>
+                        <a:t>getNumAircraftComp</a:t>
+                      </a:r>
+                      <a:r>
+                        <a:rPr lang="en-US" sz="1100" dirty="0"/>
+                        <a:t>(): int</a:t>
+                      </a:r>
+                    </a:p>
+                    <a:p>
+                      <a:r>
+                        <a:rPr lang="en-US" sz="1100" dirty="0"/>
+                        <a:t>+</a:t>
+                      </a:r>
+                      <a:r>
+                        <a:rPr lang="en-US" sz="1100" dirty="0" err="1"/>
+                        <a:t>getNumBattleshipComp</a:t>
+                      </a:r>
+                      <a:r>
+                        <a:rPr lang="en-US" sz="1100" dirty="0"/>
+                        <a:t>(): int</a:t>
+                      </a:r>
+                    </a:p>
+                    <a:p>
+                      <a:r>
+                        <a:rPr lang="en-US" sz="1100" dirty="0"/>
+                        <a:t>+</a:t>
+                      </a:r>
+                      <a:r>
+                        <a:rPr lang="en-US" sz="1100" dirty="0" err="1"/>
+                        <a:t>getNumDestroyerComp</a:t>
+                      </a:r>
+                      <a:r>
+                        <a:rPr lang="en-US" sz="1100" dirty="0"/>
+                        <a:t>(): int</a:t>
+                      </a:r>
+                    </a:p>
+                    <a:p>
+                      <a:r>
+                        <a:rPr lang="en-US" sz="1100" dirty="0"/>
+                        <a:t>+</a:t>
+                      </a:r>
+                      <a:r>
+                        <a:rPr lang="en-US" sz="1100" dirty="0" err="1"/>
+                        <a:t>getNumSubmarineComp</a:t>
+                      </a:r>
+                      <a:r>
+                        <a:rPr lang="en-US" sz="1100" dirty="0"/>
+                        <a:t>(): int</a:t>
+                      </a:r>
+                    </a:p>
+                    <a:p>
+                      <a:r>
+                        <a:rPr lang="en-US" sz="1100" dirty="0"/>
+                        <a:t>+</a:t>
+                      </a:r>
+                      <a:r>
+                        <a:rPr lang="en-US" sz="1100" dirty="0" err="1"/>
+                        <a:t>getNumPatrolBoatComp</a:t>
+                      </a:r>
+                      <a:r>
+                        <a:rPr lang="en-US" sz="1100" dirty="0"/>
+                        <a:t>(): int</a:t>
+                      </a:r>
+                    </a:p>
+                    <a:p>
+                      <a:r>
+                        <a:rPr lang="en-US" sz="1100" dirty="0"/>
+                        <a:t>+</a:t>
+                      </a:r>
+                      <a:r>
+                        <a:rPr lang="en-US" sz="1100" dirty="0" err="1"/>
                         <a:t>initBoardA</a:t>
                       </a:r>
                       <a:r>
-                        <a:rPr lang="en-US" sz="1400" dirty="0"/>
+                        <a:rPr lang="en-US" sz="1100" dirty="0"/>
                         <a:t>(): void</a:t>
                       </a:r>
                       <a:br>
-                        <a:rPr lang="en-US" sz="1400" dirty="0"/>
+                        <a:rPr lang="en-US" sz="1100" dirty="0"/>
                       </a:br>
                       <a:r>
-                        <a:rPr lang="en-US" sz="1400" dirty="0"/>
+                        <a:rPr lang="en-US" sz="1100" dirty="0"/>
                         <a:t>+</a:t>
                       </a:r>
                       <a:r>
-                        <a:rPr lang="en-US" sz="1400" dirty="0" err="1"/>
+                        <a:rPr lang="en-US" sz="1100" dirty="0" err="1"/>
                         <a:t>initBoardB</a:t>
                       </a:r>
                       <a:r>
-                        <a:rPr lang="en-US" sz="1400" dirty="0"/>
+                        <a:rPr lang="en-US" sz="1100" dirty="0"/>
                         <a:t>(): void</a:t>
                       </a:r>
                       <a:br>
-                        <a:rPr lang="en-US" sz="1400" dirty="0"/>
+                        <a:rPr lang="en-US" sz="1100" dirty="0"/>
                       </a:br>
                       <a:r>
-                        <a:rPr lang="en-US" sz="1400" dirty="0"/>
+                        <a:rPr lang="en-US" sz="1100" dirty="0"/>
                         <a:t>+</a:t>
                       </a:r>
                       <a:r>
-                        <a:rPr lang="en-US" sz="1400" dirty="0" err="1"/>
+                        <a:rPr lang="en-US" sz="1100" dirty="0" err="1"/>
                         <a:t>getBoardA</a:t>
                       </a:r>
                       <a:r>
-                        <a:rPr lang="en-US" sz="1400" dirty="0"/>
+                        <a:rPr lang="en-US" sz="1100" dirty="0"/>
                         <a:t>(): char[][]</a:t>
                       </a:r>
                       <a:br>
-                        <a:rPr lang="en-US" sz="1400" dirty="0"/>
+                        <a:rPr lang="en-US" sz="1100" dirty="0"/>
                       </a:br>
                       <a:r>
-                        <a:rPr lang="en-US" sz="1400" dirty="0"/>
+                        <a:rPr lang="en-US" sz="1100" dirty="0"/>
                         <a:t>+</a:t>
                       </a:r>
                       <a:r>
-                        <a:rPr lang="en-US" sz="1400" dirty="0" err="1"/>
+                        <a:rPr lang="en-US" sz="1100" dirty="0" err="1"/>
                         <a:t>getBoardB</a:t>
                       </a:r>
                       <a:r>
-                        <a:rPr lang="en-US" sz="1400" dirty="0"/>
+                        <a:rPr lang="en-US" sz="1100" dirty="0"/>
                         <a:t>(): char[][]</a:t>
                       </a:r>
                       <a:br>
-                        <a:rPr lang="en-US" sz="1400" dirty="0"/>
+                        <a:rPr lang="en-US" sz="1100" dirty="0"/>
                       </a:br>
                       <a:r>
-                        <a:rPr lang="en-US" sz="1400" dirty="0"/>
+                        <a:rPr lang="en-US" sz="1100" dirty="0"/>
                         <a:t>+</a:t>
                       </a:r>
                       <a:r>
-                        <a:rPr lang="en-US" sz="1400" dirty="0" err="1"/>
+                        <a:rPr lang="en-US" sz="1100" dirty="0" err="1"/>
                         <a:t>isValidAttack</a:t>
                       </a:r>
                       <a:r>
-                        <a:rPr lang="en-US" sz="1400" dirty="0"/>
+                        <a:rPr lang="en-US" sz="1100" dirty="0"/>
                         <a:t>(Coordinate): </a:t>
                       </a:r>
                       <a:r>
-                        <a:rPr lang="en-US" sz="1400" dirty="0" err="1"/>
+                        <a:rPr lang="en-US" sz="1100" dirty="0" err="1"/>
                         <a:t>boolean</a:t>
                       </a:r>
                       <a:br>
-                        <a:rPr lang="en-US" sz="1400" dirty="0"/>
+                        <a:rPr lang="en-US" sz="1100" dirty="0"/>
                       </a:br>
                       <a:r>
-                        <a:rPr lang="en-US" sz="1400" dirty="0"/>
+                        <a:rPr lang="en-US" sz="1100" dirty="0"/>
                         <a:t>+</a:t>
                       </a:r>
                       <a:r>
-                        <a:rPr lang="en-US" sz="1400" dirty="0" err="1"/>
+                        <a:rPr lang="en-US" sz="1100" dirty="0" err="1"/>
                         <a:t>isValidLocation</a:t>
                       </a:r>
                       <a:r>
-                        <a:rPr lang="en-US" sz="1400" dirty="0"/>
+                        <a:rPr lang="en-US" sz="1100" dirty="0"/>
                         <a:t>(Coordinate, Ship): </a:t>
                       </a:r>
                       <a:r>
-                        <a:rPr lang="en-US" sz="1400" dirty="0" err="1"/>
+                        <a:rPr lang="en-US" sz="1100" dirty="0" err="1"/>
                         <a:t>boolean</a:t>
                       </a:r>
                       <a:br>
-                        <a:rPr lang="en-US" sz="1400" dirty="0"/>
+                        <a:rPr lang="en-US" sz="1100" dirty="0"/>
                       </a:br>
                       <a:r>
-                        <a:rPr lang="en-US" sz="1400" dirty="0"/>
+                        <a:rPr lang="en-US" sz="1100" dirty="0"/>
                         <a:t>+</a:t>
                       </a:r>
                       <a:r>
-                        <a:rPr lang="en-US" sz="1400" dirty="0" err="1"/>
+                        <a:rPr lang="en-US" sz="1100" dirty="0" err="1"/>
                         <a:t>placeShips</a:t>
                       </a:r>
                       <a:r>
-                        <a:rPr lang="en-US" sz="1400" dirty="0"/>
+                        <a:rPr lang="en-US" sz="1100" dirty="0"/>
                         <a:t>(Coordinate, Ship): </a:t>
                       </a:r>
                       <a:r>
-                        <a:rPr lang="en-US" sz="1400" dirty="0" err="1"/>
+                        <a:rPr lang="en-US" sz="1100" dirty="0" err="1"/>
                         <a:t>boolean</a:t>
                       </a:r>
                       <a:br>
-                        <a:rPr lang="en-US" sz="1400" dirty="0"/>
+                        <a:rPr lang="en-US" sz="1100" dirty="0"/>
                       </a:br>
                       <a:r>
-                        <a:rPr lang="en-US" sz="1400" dirty="0"/>
+                        <a:rPr lang="en-US" sz="1100" dirty="0"/>
                         <a:t>+</a:t>
                       </a:r>
                       <a:r>
-                        <a:rPr lang="en-US" sz="1400" dirty="0" err="1"/>
+                        <a:rPr lang="en-US" sz="1100" dirty="0" err="1"/>
                         <a:t>printBoardA</a:t>
                       </a:r>
                       <a:r>
-                        <a:rPr lang="en-US" sz="1400" dirty="0"/>
+                        <a:rPr lang="en-US" sz="1100" dirty="0"/>
                         <a:t>(): void</a:t>
                       </a:r>
                       <a:br>
-                        <a:rPr lang="en-US" sz="1400" dirty="0"/>
+                        <a:rPr lang="en-US" sz="1100" dirty="0"/>
                       </a:br>
                       <a:r>
-                        <a:rPr lang="en-US" sz="1400" dirty="0"/>
+                        <a:rPr lang="en-US" sz="1100" dirty="0"/>
                         <a:t>+</a:t>
                       </a:r>
                       <a:r>
-                        <a:rPr lang="en-US" sz="1400" dirty="0" err="1"/>
+                        <a:rPr lang="en-US" sz="1100" dirty="0" err="1"/>
                         <a:t>printBoardB</a:t>
                       </a:r>
                       <a:r>
-                        <a:rPr lang="en-US" sz="1400" dirty="0"/>
+                        <a:rPr lang="en-US" sz="1100" dirty="0"/>
                         <a:t>(): void</a:t>
                       </a:r>
                       <a:br>
-                        <a:rPr lang="en-US" sz="1400" dirty="0"/>
+                        <a:rPr lang="en-US" sz="1100" dirty="0"/>
                       </a:br>
                       <a:r>
-                        <a:rPr lang="en-US" sz="1400" dirty="0"/>
+                        <a:rPr lang="en-US" sz="1100" dirty="0"/>
                         <a:t>+</a:t>
                       </a:r>
                       <a:r>
-                        <a:rPr lang="en-US" sz="1400" dirty="0" err="1"/>
+                        <a:rPr lang="en-US" sz="1100" dirty="0" err="1"/>
                         <a:t>printResult</a:t>
                       </a:r>
                       <a:r>
-                        <a:rPr lang="en-US" sz="1400" dirty="0"/>
+                        <a:rPr lang="en-US" sz="1100" dirty="0"/>
                         <a:t>(char): void</a:t>
                       </a:r>
                       <a:br>
-                        <a:rPr lang="en-US" sz="1400" dirty="0"/>
+                        <a:rPr lang="en-US" sz="1100" dirty="0"/>
                       </a:br>
                       <a:r>
-                        <a:rPr lang="en-US" sz="1400" dirty="0"/>
+                        <a:rPr lang="en-US" sz="1100" dirty="0"/>
                         <a:t>+</a:t>
                       </a:r>
                       <a:r>
-                        <a:rPr lang="en-US" sz="1400" dirty="0" err="1"/>
+                        <a:rPr lang="en-US" sz="1100" dirty="0" err="1"/>
                         <a:t>resultHitMissComp</a:t>
                       </a:r>
                       <a:r>
-                        <a:rPr lang="en-US" sz="1400" dirty="0"/>
+                        <a:rPr lang="en-US" sz="1100" dirty="0"/>
                         <a:t>(Coordinate, Computer): char</a:t>
                       </a:r>
                       <a:br>
-                        <a:rPr lang="en-US" sz="1400" dirty="0"/>
+                        <a:rPr lang="en-US" sz="1100" dirty="0"/>
                       </a:br>
                       <a:r>
-                        <a:rPr lang="en-US" sz="1400" dirty="0"/>
+                        <a:rPr lang="en-US" sz="1100" dirty="0"/>
                         <a:t>+</a:t>
                       </a:r>
                       <a:r>
-                        <a:rPr lang="en-US" sz="1400" dirty="0" err="1"/>
+                        <a:rPr lang="en-US" sz="1100" dirty="0" err="1"/>
                         <a:t>resultHitMissPlay</a:t>
                       </a:r>
                       <a:r>
-                        <a:rPr lang="en-US" sz="1400" dirty="0"/>
+                        <a:rPr lang="en-US" sz="1100" dirty="0"/>
                         <a:t>(Coordinate, Player): char</a:t>
                       </a:r>
                     </a:p>
@@ -4474,14 +4742,14 @@
           <p:nvPr>
             <p:extLst>
               <p:ext uri="{D42A27DB-BD31-4B8C-83A1-F6EECF244321}">
-                <p14:modId xmlns:p14="http://schemas.microsoft.com/office/powerpoint/2010/main" val="765230390"/>
+                <p14:modId xmlns:p14="http://schemas.microsoft.com/office/powerpoint/2010/main" val="703813703"/>
               </p:ext>
             </p:extLst>
           </p:nvPr>
         </p:nvGraphicFramePr>
         <p:xfrm>
-          <a:off x="7224714" y="73660"/>
-          <a:ext cx="4591807" cy="2865553"/>
+          <a:off x="7166073" y="73660"/>
+          <a:ext cx="4834891" cy="2932689"/>
         </p:xfrm>
         <a:graphic>
           <a:graphicData uri="http://schemas.openxmlformats.org/drawingml/2006/table">
@@ -4490,7 +4758,7 @@
                 <a:tableStyleId>{5C22544A-7EE6-4342-B048-85BDC9FD1C3A}</a:tableStyleId>
               </a:tblPr>
               <a:tblGrid>
-                <a:gridCol w="4591807">
+                <a:gridCol w="4834891">
                   <a:extLst>
                     <a:ext uri="{9D8B030D-6E8A-4147-A177-3AD203B41FA5}">
                       <a16:colId xmlns:a16="http://schemas.microsoft.com/office/drawing/2014/main" val="3169994630"/>
@@ -4498,7 +4766,7 @@
                   </a:extLst>
                 </a:gridCol>
               </a:tblGrid>
-              <a:tr h="148363">
+              <a:tr h="384163">
                 <a:tc>
                   <a:txBody>
                     <a:bodyPr/>
@@ -4519,21 +4787,21 @@
                   </a:ext>
                 </a:extLst>
               </a:tr>
-              <a:tr h="701473">
+              <a:tr h="531673">
                 <a:tc>
                   <a:txBody>
                     <a:bodyPr/>
                     <a:lstStyle/>
                     <a:p>
                       <a:r>
-                        <a:rPr lang="en-US" sz="1400" dirty="0"/>
-                        <a:t>boards: Boards</a:t>
+                        <a:rPr lang="en-US" sz="1200" dirty="0"/>
+                        <a:t>board: Boards</a:t>
                       </a:r>
                       <a:br>
-                        <a:rPr lang="en-US" sz="1400" dirty="0"/>
+                        <a:rPr lang="en-US" sz="1200" dirty="0"/>
                       </a:br>
                       <a:r>
-                        <a:rPr lang="en-US" sz="1400" dirty="0"/>
+                        <a:rPr lang="en-US" sz="1200" dirty="0"/>
                         <a:t>scanner: Scanner</a:t>
                       </a:r>
                     </a:p>
@@ -4546,126 +4814,164 @@
                   </a:ext>
                 </a:extLst>
               </a:tr>
-              <a:tr h="1606481">
+              <a:tr h="2016853">
                 <a:tc>
                   <a:txBody>
                     <a:bodyPr/>
                     <a:lstStyle/>
                     <a:p>
                       <a:r>
-                        <a:rPr lang="en-US" sz="1400" dirty="0"/>
+                        <a:rPr lang="en-US" sz="1200" dirty="0"/>
                         <a:t>+Player()</a:t>
                       </a:r>
                       <a:br>
-                        <a:rPr lang="en-US" sz="1400" dirty="0"/>
+                        <a:rPr lang="en-US" sz="1200" dirty="0"/>
                       </a:br>
                       <a:r>
-                        <a:rPr lang="en-US" sz="1400" dirty="0"/>
+                        <a:rPr lang="en-US" sz="1200" dirty="0"/>
                         <a:t>+</a:t>
                       </a:r>
                       <a:r>
-                        <a:rPr lang="en-US" sz="1400" dirty="0" err="1"/>
+                        <a:rPr lang="en-US" sz="1200" dirty="0" err="1"/>
                         <a:t>fireAndAttackComp</a:t>
                       </a:r>
                       <a:r>
-                        <a:rPr lang="en-US" sz="1400" dirty="0"/>
+                        <a:rPr lang="en-US" sz="1200" dirty="0"/>
                         <a:t>(Computer, Coordinate): void</a:t>
                       </a:r>
                       <a:br>
-                        <a:rPr lang="en-US" sz="1400" dirty="0"/>
+                        <a:rPr lang="en-US" sz="1200" dirty="0"/>
                       </a:br>
                       <a:r>
-                        <a:rPr lang="en-US" sz="1400" dirty="0"/>
+                        <a:rPr lang="en-US" sz="1200" dirty="0"/>
                         <a:t>+</a:t>
                       </a:r>
                       <a:r>
-                        <a:rPr lang="en-US" sz="1400" dirty="0" err="1"/>
+                        <a:rPr lang="en-US" sz="1200" dirty="0" err="1"/>
                         <a:t>getBoardA</a:t>
                       </a:r>
                       <a:r>
-                        <a:rPr lang="en-US" sz="1400" dirty="0"/>
+                        <a:rPr lang="en-US" sz="1200" dirty="0"/>
                         <a:t>(): char[][]</a:t>
                       </a:r>
                       <a:br>
-                        <a:rPr lang="en-US" sz="1400" dirty="0"/>
+                        <a:rPr lang="en-US" sz="1200" dirty="0"/>
                       </a:br>
                       <a:r>
-                        <a:rPr lang="en-US" sz="1400" dirty="0"/>
+                        <a:rPr lang="en-US" sz="1200" dirty="0"/>
                         <a:t>+</a:t>
                       </a:r>
                       <a:r>
-                        <a:rPr lang="en-US" sz="1400" dirty="0" err="1"/>
+                        <a:rPr lang="en-US" sz="1200" dirty="0" err="1"/>
                         <a:t>getBoardB</a:t>
                       </a:r>
                       <a:r>
-                        <a:rPr lang="en-US" sz="1400" dirty="0"/>
+                        <a:rPr lang="en-US" sz="1200" dirty="0"/>
                         <a:t>(): char[][]</a:t>
                       </a:r>
                       <a:br>
-                        <a:rPr lang="en-US" sz="1400" dirty="0"/>
+                        <a:rPr lang="en-US" sz="1200" dirty="0"/>
                       </a:br>
                       <a:r>
-                        <a:rPr lang="en-US" sz="1400" dirty="0"/>
+                        <a:rPr lang="en-US" sz="1200" dirty="0"/>
                         <a:t>+</a:t>
                       </a:r>
                       <a:r>
-                        <a:rPr lang="en-US" sz="1400" dirty="0" err="1"/>
+                        <a:rPr lang="en-US" sz="1200" dirty="0" err="1"/>
                         <a:t>playerSetUp</a:t>
                       </a:r>
                       <a:r>
-                        <a:rPr lang="en-US" sz="1400" dirty="0"/>
+                        <a:rPr lang="en-US" sz="1200" dirty="0"/>
                         <a:t>(): void</a:t>
                       </a:r>
                       <a:br>
-                        <a:rPr lang="en-US" sz="1400" dirty="0"/>
+                        <a:rPr lang="en-US" sz="1200" dirty="0"/>
                       </a:br>
                       <a:r>
-                        <a:rPr lang="en-US" sz="1400" dirty="0"/>
+                        <a:rPr lang="en-US" sz="1200" dirty="0"/>
                         <a:t>+</a:t>
                       </a:r>
                       <a:r>
-                        <a:rPr lang="en-US" sz="1400" dirty="0" err="1"/>
+                        <a:rPr lang="en-US" sz="1200" dirty="0" err="1"/>
                         <a:t>playerGuessAttack</a:t>
                       </a:r>
                       <a:r>
-                        <a:rPr lang="en-US" sz="1400" dirty="0"/>
+                        <a:rPr lang="en-US" sz="1200" dirty="0"/>
                         <a:t>(): Coordinate</a:t>
                       </a:r>
                       <a:br>
-                        <a:rPr lang="en-US" sz="1400" dirty="0"/>
+                        <a:rPr lang="en-US" sz="1200" dirty="0"/>
                       </a:br>
                       <a:r>
-                        <a:rPr lang="en-US" sz="1400" dirty="0"/>
+                        <a:rPr lang="en-US" sz="1200" dirty="0"/>
                         <a:t>+</a:t>
                       </a:r>
                       <a:r>
-                        <a:rPr lang="en-US" sz="1400" dirty="0" err="1"/>
+                        <a:rPr lang="en-US" sz="1200" dirty="0" err="1"/>
                         <a:t>printBoard</a:t>
                       </a:r>
                       <a:r>
-                        <a:rPr lang="en-US" sz="1400" dirty="0"/>
-                        <a:t>(char[][]): void</a:t>
+                        <a:rPr lang="en-US" sz="1200" dirty="0"/>
+                        <a:t>(): void</a:t>
                       </a:r>
                       <a:br>
-                        <a:rPr lang="en-US" sz="1400" dirty="0"/>
+                        <a:rPr lang="en-US" sz="1200" dirty="0"/>
                       </a:br>
                       <a:r>
-                        <a:rPr lang="en-US" sz="1400" dirty="0"/>
+                        <a:rPr lang="en-US" sz="1200" dirty="0"/>
                         <a:t>+</a:t>
                       </a:r>
                       <a:r>
-                        <a:rPr lang="en-US" sz="1400" dirty="0" err="1"/>
+                        <a:rPr lang="en-US" sz="1200" dirty="0" err="1"/>
                         <a:t>verifyPlayerWin</a:t>
                       </a:r>
                       <a:r>
-                        <a:rPr lang="en-US" sz="1400" dirty="0"/>
-                        <a:t>(Computer): </a:t>
-                      </a:r>
-                      <a:r>
-                        <a:rPr lang="en-US" sz="1400" dirty="0" err="1"/>
+                        <a:rPr lang="en-US" sz="1200" dirty="0"/>
+                        <a:t>(): </a:t>
+                      </a:r>
+                      <a:r>
+                        <a:rPr lang="en-US" sz="1200" dirty="0" err="1"/>
                         <a:t>boolean</a:t>
                       </a:r>
-                      <a:endParaRPr lang="en-US" dirty="0"/>
+                      <a:endParaRPr lang="en-US" sz="1200" dirty="0"/>
+                    </a:p>
+                    <a:p>
+                      <a:r>
+                        <a:rPr lang="en-US" sz="1200" dirty="0"/>
+                        <a:t>+</a:t>
+                      </a:r>
+                      <a:r>
+                        <a:rPr lang="en-US" sz="1200" dirty="0" err="1"/>
+                        <a:t>validateAttackInput</a:t>
+                      </a:r>
+                      <a:r>
+                        <a:rPr lang="en-US" sz="1200" dirty="0"/>
+                        <a:t>(String): </a:t>
+                      </a:r>
+                      <a:r>
+                        <a:rPr lang="en-US" sz="1200" dirty="0" err="1"/>
+                        <a:t>boolean</a:t>
+                      </a:r>
+                      <a:endParaRPr lang="en-US" sz="1200" dirty="0"/>
+                    </a:p>
+                    <a:p>
+                      <a:r>
+                        <a:rPr lang="en-US" sz="1200" dirty="0"/>
+                        <a:t>+</a:t>
+                      </a:r>
+                      <a:r>
+                        <a:rPr lang="en-US" sz="1200" dirty="0" err="1"/>
+                        <a:t>validateDirectionInput</a:t>
+                      </a:r>
+                      <a:r>
+                        <a:rPr lang="en-US" sz="1200" dirty="0"/>
+                        <a:t>(char): </a:t>
+                      </a:r>
+                      <a:r>
+                        <a:rPr lang="en-US" sz="1200" dirty="0" err="1"/>
+                        <a:t>boolean</a:t>
+                      </a:r>
+                      <a:endParaRPr lang="en-US" sz="1600" dirty="0"/>
                     </a:p>
                   </a:txBody>
                   <a:tcPr/>
@@ -4695,14 +5001,14 @@
           <p:nvPr>
             <p:extLst>
               <p:ext uri="{D42A27DB-BD31-4B8C-83A1-F6EECF244321}">
-                <p14:modId xmlns:p14="http://schemas.microsoft.com/office/powerpoint/2010/main" val="2232354991"/>
+                <p14:modId xmlns:p14="http://schemas.microsoft.com/office/powerpoint/2010/main" val="3962372005"/>
               </p:ext>
             </p:extLst>
           </p:nvPr>
         </p:nvGraphicFramePr>
         <p:xfrm>
-          <a:off x="7224714" y="3108960"/>
-          <a:ext cx="4776252" cy="3595318"/>
+          <a:off x="7166073" y="3068410"/>
+          <a:ext cx="4834893" cy="3715929"/>
         </p:xfrm>
         <a:graphic>
           <a:graphicData uri="http://schemas.openxmlformats.org/drawingml/2006/table">
@@ -4711,7 +5017,7 @@
                 <a:tableStyleId>{21E4AEA4-8DFA-4A89-87EB-49C32662AFE0}</a:tableStyleId>
               </a:tblPr>
               <a:tblGrid>
-                <a:gridCol w="4776252">
+                <a:gridCol w="4834893">
                   <a:extLst>
                     <a:ext uri="{9D8B030D-6E8A-4147-A177-3AD203B41FA5}">
                       <a16:colId xmlns:a16="http://schemas.microsoft.com/office/drawing/2014/main" val="3026512876"/>
@@ -4719,7 +5025,7 @@
                   </a:extLst>
                 </a:gridCol>
               </a:tblGrid>
-              <a:tr h="425398">
+              <a:tr h="371593">
                 <a:tc>
                   <a:txBody>
                     <a:bodyPr/>
@@ -4740,56 +5046,73 @@
                   </a:ext>
                 </a:extLst>
               </a:tr>
-              <a:tr h="425398">
+              <a:tr h="1021880">
                 <a:tc>
                   <a:txBody>
                     <a:bodyPr/>
                     <a:lstStyle/>
                     <a:p>
                       <a:r>
-                        <a:rPr lang="en-US" sz="1400" dirty="0"/>
-                        <a:t>boards: Boards</a:t>
+                        <a:rPr lang="en-US" sz="1200" dirty="0"/>
+                        <a:t>board: Boards</a:t>
                       </a:r>
                     </a:p>
                     <a:p>
                       <a:r>
-                        <a:rPr lang="en-US" sz="1400" dirty="0"/>
-                        <a:t>c</a:t>
-                      </a:r>
-                      <a:r>
-                        <a:rPr lang="en-US" sz="1400"/>
-                        <a:t>oords</a:t>
-                      </a:r>
-                      <a:r>
-                        <a:rPr lang="en-US" sz="1400" dirty="0"/>
+                        <a:rPr lang="en-US" sz="1200" dirty="0" err="1"/>
+                        <a:t>coordsChosen</a:t>
+                      </a:r>
+                      <a:r>
+                        <a:rPr lang="en-US" sz="1200" dirty="0"/>
                         <a:t>: </a:t>
                       </a:r>
                       <a:r>
-                        <a:rPr lang="en-US" sz="1400" dirty="0" err="1"/>
+                        <a:rPr lang="en-US" sz="1200" dirty="0" err="1"/>
                         <a:t>ArrayList</a:t>
                       </a:r>
                       <a:r>
-                        <a:rPr lang="en-US" sz="1400" dirty="0"/>
+                        <a:rPr lang="en-US" sz="1200" dirty="0"/>
                         <a:t>&lt;Coordinate&gt;</a:t>
                       </a:r>
                       <a:br>
-                        <a:rPr lang="en-US" sz="1400" dirty="0"/>
+                        <a:rPr lang="en-US" sz="1200" dirty="0"/>
                       </a:br>
                       <a:r>
-                        <a:rPr lang="en-US" sz="1400" dirty="0" err="1"/>
-                        <a:t>chooseFrom</a:t>
-                      </a:r>
-                      <a:r>
-                        <a:rPr lang="en-US" sz="1400" dirty="0"/>
+                        <a:rPr lang="en-US" sz="1200" dirty="0" err="1"/>
+                        <a:t>chooseNext</a:t>
+                      </a:r>
+                      <a:r>
+                        <a:rPr lang="en-US" sz="1200" dirty="0"/>
                         <a:t>: </a:t>
                       </a:r>
                       <a:r>
-                        <a:rPr lang="en-US" sz="1400" dirty="0" err="1"/>
+                        <a:rPr lang="en-US" sz="1200" dirty="0" err="1"/>
                         <a:t>ArrayList</a:t>
                       </a:r>
                       <a:r>
-                        <a:rPr lang="en-US" sz="1400" dirty="0"/>
+                        <a:rPr lang="en-US" sz="1200" dirty="0"/>
                         <a:t>&lt;Coordinate&gt;</a:t>
+                      </a:r>
+                    </a:p>
+                    <a:p>
+                      <a:r>
+                        <a:rPr lang="en-US" sz="1200" dirty="0" err="1"/>
+                        <a:t>initAttackHit</a:t>
+                      </a:r>
+                      <a:r>
+                        <a:rPr lang="en-US" sz="1200" dirty="0"/>
+                        <a:t>: Coordinate</a:t>
+                      </a:r>
+                      <a:br>
+                        <a:rPr lang="en-US" sz="1200" dirty="0"/>
+                      </a:br>
+                      <a:r>
+                        <a:rPr lang="en-US" sz="1200" dirty="0" err="1"/>
+                        <a:t>compAttack</a:t>
+                      </a:r>
+                      <a:r>
+                        <a:rPr lang="en-US" sz="1200" dirty="0"/>
+                        <a:t>:  Coordinate</a:t>
                       </a:r>
                     </a:p>
                   </a:txBody>
@@ -4801,176 +5124,182 @@
                   </a:ext>
                 </a:extLst>
               </a:tr>
-              <a:tr h="425398">
+              <a:tr h="2322456">
                 <a:tc>
                   <a:txBody>
                     <a:bodyPr/>
                     <a:lstStyle/>
                     <a:p>
                       <a:r>
-                        <a:rPr lang="en-US" sz="1400" dirty="0"/>
+                        <a:rPr lang="en-US" sz="1200" dirty="0"/>
                         <a:t>+Computer()</a:t>
                       </a:r>
                     </a:p>
                     <a:p>
                       <a:r>
-                        <a:rPr lang="en-US" sz="1400" dirty="0"/>
+                        <a:rPr lang="en-US" sz="1200" dirty="0"/>
                         <a:t>+</a:t>
                       </a:r>
                       <a:r>
-                        <a:rPr lang="en-US" sz="1400" dirty="0" err="1"/>
+                        <a:rPr lang="en-US" sz="1200" dirty="0" err="1"/>
                         <a:t>compSetUp</a:t>
                       </a:r>
                       <a:r>
-                        <a:rPr lang="en-US" sz="1400" dirty="0"/>
+                        <a:rPr lang="en-US" sz="1200" dirty="0"/>
                         <a:t>(): void</a:t>
                       </a:r>
                       <a:br>
-                        <a:rPr lang="en-US" sz="1400" dirty="0"/>
+                        <a:rPr lang="en-US" sz="1200" dirty="0"/>
                       </a:br>
                       <a:r>
-                        <a:rPr lang="en-US" sz="1400" dirty="0"/>
+                        <a:rPr lang="en-US" sz="1200" dirty="0"/>
                         <a:t>+</a:t>
                       </a:r>
                       <a:r>
-                        <a:rPr lang="en-US" sz="1400" dirty="0" err="1"/>
+                        <a:rPr lang="en-US" sz="1200" dirty="0" err="1"/>
                         <a:t>attackPlayer</a:t>
                       </a:r>
                       <a:r>
-                        <a:rPr lang="en-US" sz="1400" dirty="0"/>
+                        <a:rPr lang="en-US" sz="1200" dirty="0"/>
                         <a:t>(Player, Coordinate): void</a:t>
                       </a:r>
+                    </a:p>
+                    <a:p>
+                      <a:r>
+                        <a:rPr lang="en-US" sz="1200" dirty="0"/>
+                        <a:t>-</a:t>
+                      </a:r>
+                      <a:r>
+                        <a:rPr lang="en-US" sz="1200" dirty="0" err="1"/>
+                        <a:t>removeDuplicates</a:t>
+                      </a:r>
+                      <a:r>
+                        <a:rPr lang="en-US" sz="1200" dirty="0"/>
+                        <a:t>: void</a:t>
+                      </a:r>
                       <a:br>
-                        <a:rPr lang="en-US" sz="1400" dirty="0"/>
+                        <a:rPr lang="en-US" sz="1200" dirty="0"/>
                       </a:br>
                       <a:r>
-                        <a:rPr lang="en-US" sz="1400" dirty="0"/>
+                        <a:rPr lang="en-US" sz="1200" dirty="0"/>
                         <a:t>+</a:t>
                       </a:r>
                       <a:r>
-                        <a:rPr lang="en-US" sz="1400" dirty="0" err="1"/>
+                        <a:rPr lang="en-US" sz="1200" dirty="0" err="1"/>
                         <a:t>getBoardA</a:t>
                       </a:r>
                       <a:r>
-                        <a:rPr lang="en-US" sz="1400" dirty="0"/>
+                        <a:rPr lang="en-US" sz="1200" dirty="0"/>
                         <a:t>(): char[][]</a:t>
                       </a:r>
                       <a:br>
-                        <a:rPr lang="en-US" sz="1400" dirty="0"/>
+                        <a:rPr lang="en-US" sz="1200" dirty="0"/>
                       </a:br>
                       <a:r>
-                        <a:rPr lang="en-US" sz="1400" dirty="0"/>
+                        <a:rPr lang="en-US" sz="1200" dirty="0"/>
                         <a:t>+</a:t>
                       </a:r>
                       <a:r>
-                        <a:rPr lang="en-US" sz="1400" dirty="0" err="1"/>
+                        <a:rPr lang="en-US" sz="1200" dirty="0" err="1"/>
                         <a:t>getBoardB</a:t>
                       </a:r>
                       <a:r>
-                        <a:rPr lang="en-US" sz="1400" dirty="0"/>
+                        <a:rPr lang="en-US" sz="1200" dirty="0"/>
                         <a:t>(): char[][]</a:t>
                       </a:r>
                       <a:br>
-                        <a:rPr lang="en-US" sz="1400" dirty="0"/>
+                        <a:rPr lang="en-US" sz="1200" dirty="0"/>
                       </a:br>
                       <a:r>
-                        <a:rPr lang="en-US" sz="1400" dirty="0"/>
+                        <a:rPr lang="en-US" sz="1200" dirty="0"/>
                         <a:t>+</a:t>
                       </a:r>
                       <a:r>
-                        <a:rPr lang="en-US" sz="1400" dirty="0" err="1"/>
+                        <a:rPr lang="en-US" sz="1200" dirty="0" err="1"/>
                         <a:t>getPredictedCoord</a:t>
                       </a:r>
                       <a:r>
-                        <a:rPr lang="en-US" sz="1400" dirty="0"/>
+                        <a:rPr lang="en-US" sz="1200" dirty="0"/>
                         <a:t>(Player): Coordinate</a:t>
                       </a:r>
                       <a:br>
-                        <a:rPr lang="en-US" sz="1400" dirty="0"/>
+                        <a:rPr lang="en-US" sz="1200" dirty="0"/>
                       </a:br>
                       <a:r>
-                        <a:rPr lang="en-US" sz="1400" dirty="0"/>
+                        <a:rPr lang="en-US" sz="1200" dirty="0"/>
                         <a:t>+</a:t>
                       </a:r>
                       <a:r>
-                        <a:rPr lang="en-US" sz="1400" dirty="0" err="1"/>
+                        <a:rPr lang="en-US" sz="1200" dirty="0" err="1"/>
                         <a:t>printResult</a:t>
                       </a:r>
                       <a:r>
-                        <a:rPr lang="en-US" sz="1400" dirty="0"/>
+                        <a:rPr lang="en-US" sz="1200" dirty="0"/>
                         <a:t>(char): void</a:t>
                       </a:r>
                       <a:br>
-                        <a:rPr lang="en-US" sz="1400" dirty="0"/>
+                        <a:rPr lang="en-US" sz="1200" dirty="0"/>
                       </a:br>
                       <a:r>
-                        <a:rPr lang="en-US" sz="1400" dirty="0"/>
+                        <a:rPr lang="en-US" sz="1200" dirty="0"/>
                         <a:t>+</a:t>
                       </a:r>
                       <a:r>
-                        <a:rPr lang="en-US" sz="1400" dirty="0" err="1"/>
+                        <a:rPr lang="en-US" sz="1200" dirty="0" err="1"/>
                         <a:t>randomDirection</a:t>
                       </a:r>
                       <a:r>
-                        <a:rPr lang="en-US" sz="1400" dirty="0"/>
+                        <a:rPr lang="en-US" sz="1200" dirty="0"/>
                         <a:t>(): char</a:t>
                       </a:r>
                       <a:br>
-                        <a:rPr lang="en-US" sz="1400" dirty="0"/>
+                        <a:rPr lang="en-US" sz="1200" dirty="0"/>
                       </a:br>
                       <a:r>
-                        <a:rPr lang="en-US" sz="1400" dirty="0"/>
+                        <a:rPr lang="en-US" sz="1200" dirty="0"/>
                         <a:t>+</a:t>
                       </a:r>
                       <a:r>
-                        <a:rPr lang="en-US" sz="1400" dirty="0" err="1"/>
+                        <a:rPr lang="en-US" sz="1200" dirty="0" err="1"/>
                         <a:t>randomCoordinate</a:t>
                       </a:r>
                       <a:r>
-                        <a:rPr lang="en-US" sz="1400" dirty="0"/>
+                        <a:rPr lang="en-US" sz="1200" dirty="0"/>
                         <a:t>(): Coordinate</a:t>
                       </a:r>
                       <a:br>
-                        <a:rPr lang="en-US" sz="1400" dirty="0"/>
+                        <a:rPr lang="en-US" sz="1200" dirty="0"/>
                       </a:br>
                       <a:r>
-                        <a:rPr lang="en-US" sz="1400" dirty="0"/>
+                        <a:rPr lang="en-US" sz="1200" dirty="0"/>
                         <a:t>+</a:t>
                       </a:r>
                       <a:r>
-                        <a:rPr lang="en-US" sz="1400" dirty="0" err="1"/>
-                        <a:t>verifyCompW</a:t>
-                      </a:r>
-                      <a:r>
-                        <a:rPr lang="en-US" sz="1400" dirty="0"/>
-                        <a:t>(Player): </a:t>
-                      </a:r>
-                      <a:r>
-                        <a:rPr lang="en-US" sz="1400" dirty="0" err="1"/>
+                        <a:rPr lang="en-US" sz="1200" dirty="0" err="1"/>
+                        <a:t>verifyCompWin</a:t>
+                      </a:r>
+                      <a:r>
+                        <a:rPr lang="en-US" sz="1200" dirty="0"/>
+                        <a:t>(): </a:t>
+                      </a:r>
+                      <a:r>
+                        <a:rPr lang="en-US" sz="1200" dirty="0" err="1"/>
                         <a:t>boolean</a:t>
                       </a:r>
                       <a:br>
-                        <a:rPr lang="en-US" sz="1400" dirty="0"/>
+                        <a:rPr lang="en-US" sz="1200" dirty="0"/>
                       </a:br>
                       <a:r>
-                        <a:rPr lang="en-US" sz="1400" dirty="0"/>
+                        <a:rPr lang="en-US" sz="1200" dirty="0"/>
                         <a:t>+</a:t>
                       </a:r>
                       <a:r>
-                        <a:rPr lang="en-US" sz="1400" dirty="0" err="1"/>
+                        <a:rPr lang="en-US" sz="1200" dirty="0" err="1"/>
                         <a:t>chooseAdjacentLocations</a:t>
                       </a:r>
                       <a:r>
-                        <a:rPr lang="en-US" sz="1400" dirty="0"/>
-                        <a:t>(Coordinate): </a:t>
-                      </a:r>
-                      <a:r>
-                        <a:rPr lang="en-US" sz="1400" dirty="0" err="1"/>
-                        <a:t>ArrayList</a:t>
-                      </a:r>
-                      <a:r>
-                        <a:rPr lang="en-US" sz="1400" dirty="0"/>
-                        <a:t>&lt;Coordinate&gt;</a:t>
+                        <a:rPr lang="en-US" sz="1200" dirty="0"/>
+                        <a:t>(Coordinate): void</a:t>
                       </a:r>
                     </a:p>
                   </a:txBody>
@@ -5200,6 +5529,146 @@
           <a:p>
             <a:pPr algn="ctr"/>
             <a:endParaRPr lang="en-US"/>
+          </a:p>
+        </p:txBody>
+      </p:sp>
+      <p:sp>
+        <p:nvSpPr>
+          <p:cNvPr id="2" name="TextBox 1">
+            <a:extLst>
+              <a:ext uri="{FF2B5EF4-FFF2-40B4-BE49-F238E27FC236}">
+                <a16:creationId xmlns:a16="http://schemas.microsoft.com/office/drawing/2014/main" id="{63BEC199-7B28-6970-2F08-DEB17F9A7E3B}"/>
+              </a:ext>
+            </a:extLst>
+          </p:cNvPr>
+          <p:cNvSpPr txBox="1"/>
+          <p:nvPr/>
+        </p:nvSpPr>
+        <p:spPr>
+          <a:xfrm>
+            <a:off x="4569596" y="306741"/>
+            <a:ext cx="688009" cy="369332"/>
+          </a:xfrm>
+          <a:prstGeom prst="rect">
+            <a:avLst/>
+          </a:prstGeom>
+          <a:noFill/>
+        </p:spPr>
+        <p:txBody>
+          <a:bodyPr wrap="none" rtlCol="0">
+            <a:spAutoFit/>
+          </a:bodyPr>
+          <a:lstStyle/>
+          <a:p>
+            <a:r>
+              <a:rPr lang="en-US" dirty="0"/>
+              <a:t>‘0..1’</a:t>
+            </a:r>
+          </a:p>
+        </p:txBody>
+      </p:sp>
+      <p:sp>
+        <p:nvSpPr>
+          <p:cNvPr id="7" name="TextBox 6">
+            <a:extLst>
+              <a:ext uri="{FF2B5EF4-FFF2-40B4-BE49-F238E27FC236}">
+                <a16:creationId xmlns:a16="http://schemas.microsoft.com/office/drawing/2014/main" id="{78AE4CA1-5A03-FBCC-33C8-B9E8F145BE45}"/>
+              </a:ext>
+            </a:extLst>
+          </p:cNvPr>
+          <p:cNvSpPr txBox="1"/>
+          <p:nvPr/>
+        </p:nvSpPr>
+        <p:spPr>
+          <a:xfrm>
+            <a:off x="3987521" y="923765"/>
+            <a:ext cx="688009" cy="369332"/>
+          </a:xfrm>
+          <a:prstGeom prst="rect">
+            <a:avLst/>
+          </a:prstGeom>
+          <a:noFill/>
+        </p:spPr>
+        <p:txBody>
+          <a:bodyPr wrap="none" rtlCol="0">
+            <a:spAutoFit/>
+          </a:bodyPr>
+          <a:lstStyle/>
+          <a:p>
+            <a:r>
+              <a:rPr lang="en-US" dirty="0"/>
+              <a:t>‘0..1’</a:t>
+            </a:r>
+          </a:p>
+        </p:txBody>
+      </p:sp>
+      <p:sp>
+        <p:nvSpPr>
+          <p:cNvPr id="9" name="TextBox 8">
+            <a:extLst>
+              <a:ext uri="{FF2B5EF4-FFF2-40B4-BE49-F238E27FC236}">
+                <a16:creationId xmlns:a16="http://schemas.microsoft.com/office/drawing/2014/main" id="{187763C0-331B-3326-6A57-90E593B355D1}"/>
+              </a:ext>
+            </a:extLst>
+          </p:cNvPr>
+          <p:cNvSpPr txBox="1"/>
+          <p:nvPr/>
+        </p:nvSpPr>
+        <p:spPr>
+          <a:xfrm>
+            <a:off x="6620131" y="306741"/>
+            <a:ext cx="433132" cy="369332"/>
+          </a:xfrm>
+          <a:prstGeom prst="rect">
+            <a:avLst/>
+          </a:prstGeom>
+          <a:noFill/>
+        </p:spPr>
+        <p:txBody>
+          <a:bodyPr wrap="none" rtlCol="0">
+            <a:spAutoFit/>
+          </a:bodyPr>
+          <a:lstStyle/>
+          <a:p>
+            <a:r>
+              <a:rPr lang="en-US" dirty="0"/>
+              <a:t>‘1’</a:t>
+            </a:r>
+          </a:p>
+        </p:txBody>
+      </p:sp>
+      <p:sp>
+        <p:nvSpPr>
+          <p:cNvPr id="12" name="TextBox 11">
+            <a:extLst>
+              <a:ext uri="{FF2B5EF4-FFF2-40B4-BE49-F238E27FC236}">
+                <a16:creationId xmlns:a16="http://schemas.microsoft.com/office/drawing/2014/main" id="{EC28EA04-E3FB-ABC8-BE33-BFD9CD6E2060}"/>
+              </a:ext>
+            </a:extLst>
+          </p:cNvPr>
+          <p:cNvSpPr txBox="1"/>
+          <p:nvPr/>
+        </p:nvSpPr>
+        <p:spPr>
+          <a:xfrm>
+            <a:off x="6620131" y="3407743"/>
+            <a:ext cx="433132" cy="369332"/>
+          </a:xfrm>
+          <a:prstGeom prst="rect">
+            <a:avLst/>
+          </a:prstGeom>
+          <a:noFill/>
+        </p:spPr>
+        <p:txBody>
+          <a:bodyPr wrap="none" rtlCol="0">
+            <a:spAutoFit/>
+          </a:bodyPr>
+          <a:lstStyle/>
+          <a:p>
+            <a:r>
+              <a:rPr lang="en-US" dirty="0"/>
+              <a:t>‘1’</a:t>
+            </a:r>
           </a:p>
         </p:txBody>
       </p:sp>

</xml_diff>